<commit_message>
Not an Update just saying WAY TO GO GUYS
</commit_message>
<xml_diff>
--- a/Presentation.pptx
+++ b/Presentation.pptx
@@ -3151,6 +3151,114 @@
         </a:p>
       </dgm:t>
     </dgm:pt>
+    <dgm:pt modelId="{777D5AAB-9495-4FAD-A47B-3C74F459C19D}">
+      <dgm:prSet/>
+      <dgm:spPr/>
+      <dgm:t>
+        <a:bodyPr/>
+        <a:lstStyle/>
+        <a:p>
+          <a:r>
+            <a:rPr lang="en-US" dirty="0"/>
+            <a:t>Add Package</a:t>
+          </a:r>
+        </a:p>
+      </dgm:t>
+    </dgm:pt>
+    <dgm:pt modelId="{855D20EB-D458-4588-AC63-4F0B04697848}" type="parTrans" cxnId="{FCEE14D0-3C0D-49AB-A3B8-51042677973D}">
+      <dgm:prSet/>
+      <dgm:spPr/>
+      <dgm:t>
+        <a:bodyPr/>
+        <a:lstStyle/>
+        <a:p>
+          <a:endParaRPr lang="en-US"/>
+        </a:p>
+      </dgm:t>
+    </dgm:pt>
+    <dgm:pt modelId="{9843C480-786F-4D42-8D6B-6ED1A5534613}" type="sibTrans" cxnId="{FCEE14D0-3C0D-49AB-A3B8-51042677973D}">
+      <dgm:prSet/>
+      <dgm:spPr/>
+      <dgm:t>
+        <a:bodyPr/>
+        <a:lstStyle/>
+        <a:p>
+          <a:endParaRPr lang="en-US"/>
+        </a:p>
+      </dgm:t>
+    </dgm:pt>
+    <dgm:pt modelId="{9775648A-FF2E-41FC-AE38-FED826E03E8E}">
+      <dgm:prSet/>
+      <dgm:spPr/>
+      <dgm:t>
+        <a:bodyPr/>
+        <a:lstStyle/>
+        <a:p>
+          <a:r>
+            <a:rPr lang="en-US" dirty="0"/>
+            <a:t>Edit Package</a:t>
+          </a:r>
+        </a:p>
+      </dgm:t>
+    </dgm:pt>
+    <dgm:pt modelId="{6B9D5145-0180-42C9-97A1-2360DC320AB5}" type="parTrans" cxnId="{E5C0C6BD-77E9-4D42-B86F-325A59A5EED7}">
+      <dgm:prSet/>
+      <dgm:spPr/>
+      <dgm:t>
+        <a:bodyPr/>
+        <a:lstStyle/>
+        <a:p>
+          <a:endParaRPr lang="en-US"/>
+        </a:p>
+      </dgm:t>
+    </dgm:pt>
+    <dgm:pt modelId="{9DDD7B76-2DAA-4203-8DE8-ED0080712EC5}" type="sibTrans" cxnId="{E5C0C6BD-77E9-4D42-B86F-325A59A5EED7}">
+      <dgm:prSet/>
+      <dgm:spPr/>
+      <dgm:t>
+        <a:bodyPr/>
+        <a:lstStyle/>
+        <a:p>
+          <a:endParaRPr lang="en-US"/>
+        </a:p>
+      </dgm:t>
+    </dgm:pt>
+    <dgm:pt modelId="{37389A9E-F859-4E13-AF85-8A12F0388882}">
+      <dgm:prSet/>
+      <dgm:spPr/>
+      <dgm:t>
+        <a:bodyPr/>
+        <a:lstStyle/>
+        <a:p>
+          <a:r>
+            <a:rPr lang="en-US" dirty="0"/>
+            <a:t>Add Product</a:t>
+          </a:r>
+        </a:p>
+      </dgm:t>
+    </dgm:pt>
+    <dgm:pt modelId="{8C75D0B0-21DB-41A5-A698-3B1CAE7883E7}" type="parTrans" cxnId="{A9961CCD-9038-47B7-9893-D3D274E7DF57}">
+      <dgm:prSet/>
+      <dgm:spPr/>
+      <dgm:t>
+        <a:bodyPr/>
+        <a:lstStyle/>
+        <a:p>
+          <a:endParaRPr lang="en-US"/>
+        </a:p>
+      </dgm:t>
+    </dgm:pt>
+    <dgm:pt modelId="{9BAB571A-279E-4B0F-BBD9-6791C97540FF}" type="sibTrans" cxnId="{A9961CCD-9038-47B7-9893-D3D274E7DF57}">
+      <dgm:prSet/>
+      <dgm:spPr/>
+      <dgm:t>
+        <a:bodyPr/>
+        <a:lstStyle/>
+        <a:p>
+          <a:endParaRPr lang="en-US"/>
+        </a:p>
+      </dgm:t>
+    </dgm:pt>
     <dgm:pt modelId="{0B20150E-E551-4454-92A6-28534836EBB1}" type="pres">
       <dgm:prSet presAssocID="{4545FB73-95F9-499B-8FB4-3EAFC8DF2F38}" presName="linearFlow" presStyleCnt="0">
         <dgm:presLayoutVars>
@@ -3326,6 +3434,8 @@
     <dgm:cxn modelId="{43A09A1D-E03C-48EC-9290-1309E2DF3BF7}" type="presOf" srcId="{4A8EE8A9-DCDF-4A2B-8C54-35DA34636488}" destId="{5C6144ED-8206-4833-911D-F402316D4301}" srcOrd="0" destOrd="0" presId="urn:microsoft.com/office/officeart/2005/8/layout/hList2"/>
     <dgm:cxn modelId="{C4AD1A28-D913-4628-B65B-15E72939E095}" srcId="{4A8EE8A9-DCDF-4A2B-8C54-35DA34636488}" destId="{256F4E74-68F5-4C1F-8287-0B37B2FEA467}" srcOrd="2" destOrd="0" parTransId="{5BD1A77E-03FA-4BD0-A0EF-0CA963A64111}" sibTransId="{2E25713E-FF06-497C-8345-0CAFFA097948}"/>
     <dgm:cxn modelId="{D23D9B30-4B90-4357-8B66-366CA408F3F2}" type="presOf" srcId="{6E34B88F-5F2B-4C96-85DC-4421AFDAF1EA}" destId="{8C285C30-CE49-44FC-A361-751FAFC97CDE}" srcOrd="0" destOrd="0" presId="urn:microsoft.com/office/officeart/2005/8/layout/hList2"/>
+    <dgm:cxn modelId="{DE613034-3E5D-4A07-BDDD-404892058CDB}" type="presOf" srcId="{777D5AAB-9495-4FAD-A47B-3C74F459C19D}" destId="{67BDA4C9-184E-4707-AF56-FF94C17E539C}" srcOrd="0" destOrd="2" presId="urn:microsoft.com/office/officeart/2005/8/layout/hList2"/>
+    <dgm:cxn modelId="{59DA683E-8CB2-4BBC-AB9C-3A720C2B84B3}" type="presOf" srcId="{37389A9E-F859-4E13-AF85-8A12F0388882}" destId="{67BDA4C9-184E-4707-AF56-FF94C17E539C}" srcOrd="0" destOrd="4" presId="urn:microsoft.com/office/officeart/2005/8/layout/hList2"/>
     <dgm:cxn modelId="{346A2565-5F08-400F-B605-18FDE45FA849}" srcId="{4A8EE8A9-DCDF-4A2B-8C54-35DA34636488}" destId="{37297818-28D5-4417-ACAA-5DF1C03B40B4}" srcOrd="1" destOrd="0" parTransId="{9FE76B67-4927-4DDA-9A46-79FA084D8C76}" sibTransId="{E29930F9-F525-4B0B-B614-DE6BD13B1754}"/>
     <dgm:cxn modelId="{399F1C47-E9C1-4B93-B072-5640BE7C5DCE}" type="presOf" srcId="{4545FB73-95F9-499B-8FB4-3EAFC8DF2F38}" destId="{0B20150E-E551-4454-92A6-28534836EBB1}" srcOrd="0" destOrd="0" presId="urn:microsoft.com/office/officeart/2005/8/layout/hList2"/>
     <dgm:cxn modelId="{D0738D48-E9CB-41CF-AE1F-0944B3DB27BA}" type="presOf" srcId="{0C5F3D90-90AE-4282-886B-D3312C9E47AA}" destId="{B2CAFC69-67B6-44CA-A449-49A34B0B1CDE}" srcOrd="0" destOrd="0" presId="urn:microsoft.com/office/officeart/2005/8/layout/hList2"/>
@@ -3336,7 +3446,11 @@
     <dgm:cxn modelId="{1A7C53A7-2706-4BBD-B293-D5F7635EBA18}" type="presOf" srcId="{BBA3A8DA-FB68-4AEF-8863-50698EFCC8FC}" destId="{72E433AF-8A7A-4A01-AC06-7762FD12D5E1}" srcOrd="0" destOrd="1" presId="urn:microsoft.com/office/officeart/2005/8/layout/hList2"/>
     <dgm:cxn modelId="{EAE086AC-5C4C-46DA-A678-9A6CFC101BC1}" type="presOf" srcId="{D8C538EE-7705-4C75-B17B-6CC2D8B4875D}" destId="{67BDA4C9-184E-4707-AF56-FF94C17E539C}" srcOrd="0" destOrd="0" presId="urn:microsoft.com/office/officeart/2005/8/layout/hList2"/>
     <dgm:cxn modelId="{484510AD-FC0C-4C1A-9B3D-4B0552C47F20}" srcId="{4545FB73-95F9-499B-8FB4-3EAFC8DF2F38}" destId="{006D91B3-AAC0-4BC5-8531-9729ACE79BCA}" srcOrd="1" destOrd="0" parTransId="{A07BA2AD-2160-45C5-B183-7DEE4B143CA7}" sibTransId="{8954F626-BFB3-4827-9DEB-B81E74EFC300}"/>
+    <dgm:cxn modelId="{E5C0C6BD-77E9-4D42-B86F-325A59A5EED7}" srcId="{BC83A6CC-CB78-45B3-B763-1601D82031AB}" destId="{9775648A-FF2E-41FC-AE38-FED826E03E8E}" srcOrd="1" destOrd="0" parTransId="{6B9D5145-0180-42C9-97A1-2360DC320AB5}" sibTransId="{9DDD7B76-2DAA-4203-8DE8-ED0080712EC5}"/>
     <dgm:cxn modelId="{6FF28EC1-4392-403B-8B99-493BB535025A}" type="presOf" srcId="{256F4E74-68F5-4C1F-8287-0B37B2FEA467}" destId="{8C285C30-CE49-44FC-A361-751FAFC97CDE}" srcOrd="0" destOrd="2" presId="urn:microsoft.com/office/officeart/2005/8/layout/hList2"/>
+    <dgm:cxn modelId="{A9961CCD-9038-47B7-9893-D3D274E7DF57}" srcId="{BC83A6CC-CB78-45B3-B763-1601D82031AB}" destId="{37389A9E-F859-4E13-AF85-8A12F0388882}" srcOrd="2" destOrd="0" parTransId="{8C75D0B0-21DB-41A5-A698-3B1CAE7883E7}" sibTransId="{9BAB571A-279E-4B0F-BBD9-6791C97540FF}"/>
+    <dgm:cxn modelId="{FCEE14D0-3C0D-49AB-A3B8-51042677973D}" srcId="{BC83A6CC-CB78-45B3-B763-1601D82031AB}" destId="{777D5AAB-9495-4FAD-A47B-3C74F459C19D}" srcOrd="0" destOrd="0" parTransId="{855D20EB-D458-4588-AC63-4F0B04697848}" sibTransId="{9843C480-786F-4D42-8D6B-6ED1A5534613}"/>
+    <dgm:cxn modelId="{8C3EC1D1-6C07-48EF-A8A0-2BAD26B3D864}" type="presOf" srcId="{9775648A-FF2E-41FC-AE38-FED826E03E8E}" destId="{67BDA4C9-184E-4707-AF56-FF94C17E539C}" srcOrd="0" destOrd="3" presId="urn:microsoft.com/office/officeart/2005/8/layout/hList2"/>
     <dgm:cxn modelId="{10F2BDE6-9DCC-4708-A68D-021DAB9359EF}" type="presOf" srcId="{BC83A6CC-CB78-45B3-B763-1601D82031AB}" destId="{67BDA4C9-184E-4707-AF56-FF94C17E539C}" srcOrd="0" destOrd="1" presId="urn:microsoft.com/office/officeart/2005/8/layout/hList2"/>
     <dgm:cxn modelId="{E7A2E8EB-53EA-45E4-8CFB-7F08C3810BF5}" srcId="{4A8EE8A9-DCDF-4A2B-8C54-35DA34636488}" destId="{6E34B88F-5F2B-4C96-85DC-4421AFDAF1EA}" srcOrd="0" destOrd="0" parTransId="{6DB0FDB0-24B2-47A4-8A3F-D6628B4A8E5F}" sibTransId="{656350C2-CD20-4627-A997-826A7F42908D}"/>
     <dgm:cxn modelId="{6B64E1EE-0190-4FB3-B70D-E30F9867204F}" srcId="{0C5F3D90-90AE-4282-886B-D3312C9E47AA}" destId="{BBA3A8DA-FB68-4AEF-8863-50698EFCC8FC}" srcOrd="1" destOrd="0" parTransId="{F1C36417-2AC6-42C8-9DEF-C2A49619724E}" sibTransId="{0CE67E49-3E2F-4775-9170-6C05C83425A8}"/>
@@ -5087,6 +5201,60 @@
           <a:r>
             <a:rPr lang="en-US" sz="1600" kern="1200" dirty="0"/>
             <a:t>Data Integration</a:t>
+          </a:r>
+        </a:p>
+        <a:p>
+          <a:pPr marL="342900" lvl="2" indent="-171450" algn="l" defTabSz="711200">
+            <a:lnSpc>
+              <a:spcPct val="90000"/>
+            </a:lnSpc>
+            <a:spcBef>
+              <a:spcPct val="0"/>
+            </a:spcBef>
+            <a:spcAft>
+              <a:spcPct val="15000"/>
+            </a:spcAft>
+            <a:buChar char="•"/>
+          </a:pPr>
+          <a:r>
+            <a:rPr lang="en-US" sz="1600" kern="1200" dirty="0"/>
+            <a:t>Add Package</a:t>
+          </a:r>
+        </a:p>
+        <a:p>
+          <a:pPr marL="342900" lvl="2" indent="-171450" algn="l" defTabSz="711200">
+            <a:lnSpc>
+              <a:spcPct val="90000"/>
+            </a:lnSpc>
+            <a:spcBef>
+              <a:spcPct val="0"/>
+            </a:spcBef>
+            <a:spcAft>
+              <a:spcPct val="15000"/>
+            </a:spcAft>
+            <a:buChar char="•"/>
+          </a:pPr>
+          <a:r>
+            <a:rPr lang="en-US" sz="1600" kern="1200" dirty="0"/>
+            <a:t>Edit Package</a:t>
+          </a:r>
+        </a:p>
+        <a:p>
+          <a:pPr marL="342900" lvl="2" indent="-171450" algn="l" defTabSz="711200">
+            <a:lnSpc>
+              <a:spcPct val="90000"/>
+            </a:lnSpc>
+            <a:spcBef>
+              <a:spcPct val="0"/>
+            </a:spcBef>
+            <a:spcAft>
+              <a:spcPct val="15000"/>
+            </a:spcAft>
+            <a:buChar char="•"/>
+          </a:pPr>
+          <a:r>
+            <a:rPr lang="en-US" sz="1600" kern="1200" dirty="0"/>
+            <a:t>Add Product</a:t>
           </a:r>
         </a:p>
       </dsp:txBody>
@@ -13338,7 +13506,7 @@
           <a:p>
             <a:r>
               <a:rPr lang="en-US" dirty="0"/>
-              <a:t>Work Shop 4</a:t>
+              <a:t>Web Form</a:t>
             </a:r>
           </a:p>
         </p:txBody>
@@ -13359,7 +13527,7 @@
             <p:ph idx="1"/>
             <p:extLst>
               <p:ext uri="{D42A27DB-BD31-4B8C-83A1-F6EECF244321}">
-                <p14:modId xmlns:p14="http://schemas.microsoft.com/office/powerpoint/2010/main" val="523456333"/>
+                <p14:modId xmlns:p14="http://schemas.microsoft.com/office/powerpoint/2010/main" val="1051076480"/>
               </p:ext>
             </p:extLst>
           </p:nvPr>
@@ -13515,9 +13683,10 @@
           <a:lstStyle/>
           <a:p>
             <a:r>
-              <a:rPr lang="en-US" dirty="0"/>
-              <a:t>Workshop 5</a:t>
+              <a:rPr lang="en-US"/>
+              <a:t>Web Site</a:t>
             </a:r>
+            <a:endParaRPr lang="en-US" dirty="0"/>
           </a:p>
         </p:txBody>
       </p:sp>

</xml_diff>